<commit_message>
fix(ctor): fix pptx ctor signature
</commit_message>
<xml_diff>
--- a/assets/03-01-constructeur.pptx
+++ b/assets/03-01-constructeur.pptx
@@ -248,7 +248,7 @@
           <a:p>
             <a:fld id="{33F6309C-8E8E-4E60-A612-70E839B733E3}" type="datetimeFigureOut">
               <a:rPr lang="fr-CH" smtClean="0"/>
-              <a:t>11.09.2023</a:t>
+              <a:t>15.09.2023</a:t>
             </a:fld>
             <a:endParaRPr lang="fr-CH"/>
           </a:p>
@@ -418,7 +418,7 @@
           <a:p>
             <a:fld id="{33F6309C-8E8E-4E60-A612-70E839B733E3}" type="datetimeFigureOut">
               <a:rPr lang="fr-CH" smtClean="0"/>
-              <a:t>11.09.2023</a:t>
+              <a:t>15.09.2023</a:t>
             </a:fld>
             <a:endParaRPr lang="fr-CH"/>
           </a:p>
@@ -598,7 +598,7 @@
           <a:p>
             <a:fld id="{33F6309C-8E8E-4E60-A612-70E839B733E3}" type="datetimeFigureOut">
               <a:rPr lang="fr-CH" smtClean="0"/>
-              <a:t>11.09.2023</a:t>
+              <a:t>15.09.2023</a:t>
             </a:fld>
             <a:endParaRPr lang="fr-CH"/>
           </a:p>
@@ -768,7 +768,7 @@
           <a:p>
             <a:fld id="{33F6309C-8E8E-4E60-A612-70E839B733E3}" type="datetimeFigureOut">
               <a:rPr lang="fr-CH" smtClean="0"/>
-              <a:t>11.09.2023</a:t>
+              <a:t>15.09.2023</a:t>
             </a:fld>
             <a:endParaRPr lang="fr-CH"/>
           </a:p>
@@ -1014,7 +1014,7 @@
           <a:p>
             <a:fld id="{33F6309C-8E8E-4E60-A612-70E839B733E3}" type="datetimeFigureOut">
               <a:rPr lang="fr-CH" smtClean="0"/>
-              <a:t>11.09.2023</a:t>
+              <a:t>15.09.2023</a:t>
             </a:fld>
             <a:endParaRPr lang="fr-CH"/>
           </a:p>
@@ -1246,7 +1246,7 @@
           <a:p>
             <a:fld id="{33F6309C-8E8E-4E60-A612-70E839B733E3}" type="datetimeFigureOut">
               <a:rPr lang="fr-CH" smtClean="0"/>
-              <a:t>11.09.2023</a:t>
+              <a:t>15.09.2023</a:t>
             </a:fld>
             <a:endParaRPr lang="fr-CH"/>
           </a:p>
@@ -1613,7 +1613,7 @@
           <a:p>
             <a:fld id="{33F6309C-8E8E-4E60-A612-70E839B733E3}" type="datetimeFigureOut">
               <a:rPr lang="fr-CH" smtClean="0"/>
-              <a:t>11.09.2023</a:t>
+              <a:t>15.09.2023</a:t>
             </a:fld>
             <a:endParaRPr lang="fr-CH"/>
           </a:p>
@@ -1731,7 +1731,7 @@
           <a:p>
             <a:fld id="{33F6309C-8E8E-4E60-A612-70E839B733E3}" type="datetimeFigureOut">
               <a:rPr lang="fr-CH" smtClean="0"/>
-              <a:t>11.09.2023</a:t>
+              <a:t>15.09.2023</a:t>
             </a:fld>
             <a:endParaRPr lang="fr-CH"/>
           </a:p>
@@ -1826,7 +1826,7 @@
           <a:p>
             <a:fld id="{33F6309C-8E8E-4E60-A612-70E839B733E3}" type="datetimeFigureOut">
               <a:rPr lang="fr-CH" smtClean="0"/>
-              <a:t>11.09.2023</a:t>
+              <a:t>15.09.2023</a:t>
             </a:fld>
             <a:endParaRPr lang="fr-CH"/>
           </a:p>
@@ -2103,7 +2103,7 @@
           <a:p>
             <a:fld id="{33F6309C-8E8E-4E60-A612-70E839B733E3}" type="datetimeFigureOut">
               <a:rPr lang="fr-CH" smtClean="0"/>
-              <a:t>11.09.2023</a:t>
+              <a:t>15.09.2023</a:t>
             </a:fld>
             <a:endParaRPr lang="fr-CH"/>
           </a:p>
@@ -2360,7 +2360,7 @@
           <a:p>
             <a:fld id="{33F6309C-8E8E-4E60-A612-70E839B733E3}" type="datetimeFigureOut">
               <a:rPr lang="fr-CH" smtClean="0"/>
-              <a:t>11.09.2023</a:t>
+              <a:t>15.09.2023</a:t>
             </a:fld>
             <a:endParaRPr lang="fr-CH"/>
           </a:p>
@@ -2573,7 +2573,7 @@
           <a:p>
             <a:fld id="{33F6309C-8E8E-4E60-A612-70E839B733E3}" type="datetimeFigureOut">
               <a:rPr lang="fr-CH" smtClean="0"/>
-              <a:t>11.09.2023</a:t>
+              <a:t>15.09.2023</a:t>
             </a:fld>
             <a:endParaRPr lang="fr-CH"/>
           </a:p>
@@ -3018,11 +3018,7 @@
           <a:p>
             <a:r>
               <a:rPr lang="fr-FR" dirty="0" smtClean="0"/>
-              <a:t>Programmation Orientée Objet =&gt; Compléments </a:t>
-            </a:r>
-            <a:r>
-              <a:rPr lang="fr-FR" dirty="0" smtClean="0"/>
-              <a:t>2</a:t>
+              <a:t>Programmation Orientée Objet =&gt; Compléments 2</a:t>
             </a:r>
             <a:endParaRPr lang="fr-CH" dirty="0"/>
           </a:p>
@@ -4630,16 +4626,16 @@
               <a:t>	</a:t>
             </a:r>
             <a:r>
-              <a:rPr lang="fr-FR" dirty="0"/>
+              <a:rPr lang="fr-FR"/>
               <a:t>public </a:t>
             </a:r>
             <a:r>
-              <a:rPr lang="fr-FR" dirty="0" err="1" smtClean="0"/>
-              <a:t>void</a:t>
+              <a:rPr lang="fr-FR" smtClean="0"/>
+              <a:t>Person</a:t>
             </a:r>
             <a:r>
               <a:rPr lang="fr-FR" dirty="0" smtClean="0"/>
-              <a:t> Person(){}</a:t>
+              <a:t>(){}</a:t>
             </a:r>
           </a:p>
           <a:p>
@@ -5979,6 +5975,15 @@
 </file>
 
 <file path=customXml/item1.xml><?xml version="1.0" encoding="utf-8"?>
+<?mso-contentType ?>
+<FormTemplates xmlns="http://schemas.microsoft.com/sharepoint/v3/contenttype/forms">
+  <Display>DocumentLibraryForm</Display>
+  <Edit>DocumentLibraryForm</Edit>
+  <New>DocumentLibraryForm</New>
+</FormTemplates>
+</file>
+
+<file path=customXml/item2.xml><?xml version="1.0" encoding="utf-8"?>
 <ct:contentTypeSchema xmlns:ct="http://schemas.microsoft.com/office/2006/metadata/contentType" xmlns:ma="http://schemas.microsoft.com/office/2006/metadata/properties/metaAttributes" ct:_="" ma:_="" ma:contentTypeName="Document" ma:contentTypeID="0x0101001ABD9BFFC9E543439C53A2705AE306EF" ma:contentTypeVersion="18" ma:contentTypeDescription="Crée un document." ma:contentTypeScope="" ma:versionID="49fff389824721c569041f6a3d2d54e9">
   <xsd:schema xmlns:xsd="http://www.w3.org/2001/XMLSchema" xmlns:xs="http://www.w3.org/2001/XMLSchema" xmlns:p="http://schemas.microsoft.com/office/2006/metadata/properties" xmlns:ns2="bf2f2df3-a963-4452-b0e7-67dabc627c35" xmlns:ns3="http://schemas.microsoft.com/sharepoint/v4" xmlns:ns4="f7d9f5a6-831d-4621-8c77-cbcaf993e406" targetNamespace="http://schemas.microsoft.com/office/2006/metadata/properties" ma:root="true" ma:fieldsID="9061cd853e653d4991f2824722d07c1b" ns2:_="" ns3:_="" ns4:_="">
     <xsd:import namespace="bf2f2df3-a963-4452-b0e7-67dabc627c35"/>
@@ -6238,15 +6243,6 @@
 </ct:contentTypeSchema>
 </file>
 
-<file path=customXml/item2.xml><?xml version="1.0" encoding="utf-8"?>
-<?mso-contentType ?>
-<FormTemplates xmlns="http://schemas.microsoft.com/sharepoint/v3/contenttype/forms">
-  <Display>DocumentLibraryForm</Display>
-  <Edit>DocumentLibraryForm</Edit>
-  <New>DocumentLibraryForm</New>
-</FormTemplates>
-</file>
-
 <file path=customXml/item3.xml><?xml version="1.0" encoding="utf-8"?>
 <p:properties xmlns:p="http://schemas.microsoft.com/office/2006/metadata/properties" xmlns:xsi="http://www.w3.org/2001/XMLSchema-instance" xmlns:pc="http://schemas.microsoft.com/office/infopath/2007/PartnerControls">
   <documentManagement>
@@ -6260,6 +6256,14 @@
 </file>
 
 <file path=customXml/itemProps1.xml><?xml version="1.0" encoding="utf-8"?>
+<ds:datastoreItem xmlns:ds="http://schemas.openxmlformats.org/officeDocument/2006/customXml" ds:itemID="{C182078B-F8DF-4D9F-86C3-CA77AFB8B093}">
+  <ds:schemaRefs>
+    <ds:schemaRef ds:uri="http://schemas.microsoft.com/sharepoint/v3/contenttype/forms"/>
+  </ds:schemaRefs>
+</ds:datastoreItem>
+</file>
+
+<file path=customXml/itemProps2.xml><?xml version="1.0" encoding="utf-8"?>
 <ds:datastoreItem xmlns:ds="http://schemas.openxmlformats.org/officeDocument/2006/customXml" ds:itemID="{0062CB57-4EAE-48D7-8AE7-3D11A5DF7426}">
   <ds:schemaRefs>
     <ds:schemaRef ds:uri="http://schemas.microsoft.com/office/2006/metadata/contentType"/>
@@ -6279,28 +6283,20 @@
 </ds:datastoreItem>
 </file>
 
-<file path=customXml/itemProps2.xml><?xml version="1.0" encoding="utf-8"?>
-<ds:datastoreItem xmlns:ds="http://schemas.openxmlformats.org/officeDocument/2006/customXml" ds:itemID="{C182078B-F8DF-4D9F-86C3-CA77AFB8B093}">
-  <ds:schemaRefs>
-    <ds:schemaRef ds:uri="http://schemas.microsoft.com/sharepoint/v3/contenttype/forms"/>
-  </ds:schemaRefs>
-</ds:datastoreItem>
-</file>
-
 <file path=customXml/itemProps3.xml><?xml version="1.0" encoding="utf-8"?>
 <ds:datastoreItem xmlns:ds="http://schemas.openxmlformats.org/officeDocument/2006/customXml" ds:itemID="{01E070F6-B6E4-4A85-B5F7-0336AE684D7A}">
   <ds:schemaRefs>
     <ds:schemaRef ds:uri="http://purl.org/dc/terms/"/>
+    <ds:schemaRef ds:uri="f7d9f5a6-831d-4621-8c77-cbcaf993e406"/>
+    <ds:schemaRef ds:uri="http://schemas.microsoft.com/office/2006/documentManagement/types"/>
+    <ds:schemaRef ds:uri="http://schemas.microsoft.com/office/2006/metadata/properties"/>
+    <ds:schemaRef ds:uri="http://purl.org/dc/elements/1.1/"/>
+    <ds:schemaRef ds:uri="http://schemas.microsoft.com/sharepoint/v4"/>
+    <ds:schemaRef ds:uri="http://schemas.microsoft.com/office/infopath/2007/PartnerControls"/>
+    <ds:schemaRef ds:uri="http://schemas.openxmlformats.org/package/2006/metadata/core-properties"/>
+    <ds:schemaRef ds:uri="bf2f2df3-a963-4452-b0e7-67dabc627c35"/>
+    <ds:schemaRef ds:uri="http://www.w3.org/XML/1998/namespace"/>
     <ds:schemaRef ds:uri="http://purl.org/dc/dcmitype/"/>
-    <ds:schemaRef ds:uri="http://schemas.microsoft.com/sharepoint/v4"/>
-    <ds:schemaRef ds:uri="http://schemas.microsoft.com/office/2006/documentManagement/types"/>
-    <ds:schemaRef ds:uri="http://schemas.openxmlformats.org/package/2006/metadata/core-properties"/>
-    <ds:schemaRef ds:uri="http://purl.org/dc/elements/1.1/"/>
-    <ds:schemaRef ds:uri="f7d9f5a6-831d-4621-8c77-cbcaf993e406"/>
-    <ds:schemaRef ds:uri="bf2f2df3-a963-4452-b0e7-67dabc627c35"/>
-    <ds:schemaRef ds:uri="http://schemas.microsoft.com/office/infopath/2007/PartnerControls"/>
-    <ds:schemaRef ds:uri="http://schemas.microsoft.com/office/2006/metadata/properties"/>
-    <ds:schemaRef ds:uri="http://www.w3.org/XML/1998/namespace"/>
   </ds:schemaRefs>
 </ds:datastoreItem>
 </file>
</xml_diff>